<commit_message>
Update EDA_LendingClub_Slides - Brian and Jon Combined.pptx
</commit_message>
<xml_diff>
--- a/EDA_LendingClub_Slides - Brian and Jon Combined.pptx
+++ b/EDA_LendingClub_Slides - Brian and Jon Combined.pptx
@@ -591,6 +591,238 @@
 </p:notes>
 </file>
 
+<file path=ppt/notesSlides/notesSlide10.xml><?xml version="1.0" encoding="utf-8"?>
+<p:notes xmlns:a="http://schemas.openxmlformats.org/drawingml/2006/main" xmlns:r="http://schemas.openxmlformats.org/officeDocument/2006/relationships" xmlns:p="http://schemas.openxmlformats.org/presentationml/2006/main">
+  <p:cSld>
+    <p:spTree>
+      <p:nvGrpSpPr>
+        <p:cNvPr id="1" name=""/>
+        <p:cNvGrpSpPr/>
+        <p:nvPr/>
+      </p:nvGrpSpPr>
+      <p:grpSpPr>
+        <a:xfrm>
+          <a:off x="0" y="0"/>
+          <a:ext cx="0" cy="0"/>
+          <a:chOff x="0" y="0"/>
+          <a:chExt cx="0" cy="0"/>
+        </a:xfrm>
+      </p:grpSpPr>
+      <p:sp>
+        <p:nvSpPr>
+          <p:cNvPr id="2" name="Slide Image Placeholder 1"/>
+          <p:cNvSpPr>
+            <a:spLocks noGrp="1" noRot="1" noChangeAspect="1"/>
+          </p:cNvSpPr>
+          <p:nvPr>
+            <p:ph type="sldImg"/>
+          </p:nvPr>
+        </p:nvSpPr>
+        <p:spPr/>
+      </p:sp>
+      <p:sp>
+        <p:nvSpPr>
+          <p:cNvPr id="3" name="Notes Placeholder 2"/>
+          <p:cNvSpPr>
+            <a:spLocks noGrp="1"/>
+          </p:cNvSpPr>
+          <p:nvPr>
+            <p:ph type="body" idx="1"/>
+          </p:nvPr>
+        </p:nvSpPr>
+        <p:spPr/>
+        <p:txBody>
+          <a:bodyPr/>
+          <a:lstStyle/>
+          <a:p>
+            <a:r>
+              <a:rPr lang="en-US" dirty="0"/>
+              <a:t>From this we can see that about 13.2% of borrowers who met the credit underwriting criteria did not fully pay, while for the borrowers who did not meet the credit underwriting criteria about 27.8% did not fully pay.</a:t>
+            </a:r>
+          </a:p>
+          <a:p>
+            <a:endParaRPr lang="en-US" dirty="0"/>
+          </a:p>
+          <a:p>
+            <a:r>
+              <a:rPr lang="en-US" dirty="0"/>
+              <a:t>This indicates borrowers who did not meet the credit underwriting criteria were almost twice as likely to be default on their loans than those who did meet the criteria. For comparison, default rates on loans from commercial banks for the same period as our dataset averaged 4.48%, with a maximum default rate of 7.49% default rate towards the end of 2009, according to the St. Louis Federal Reserve Bank.</a:t>
+            </a:r>
+          </a:p>
+        </p:txBody>
+      </p:sp>
+      <p:sp>
+        <p:nvSpPr>
+          <p:cNvPr id="4" name="Slide Number Placeholder 3"/>
+          <p:cNvSpPr>
+            <a:spLocks noGrp="1"/>
+          </p:cNvSpPr>
+          <p:nvPr>
+            <p:ph type="sldNum" sz="quarter" idx="5"/>
+          </p:nvPr>
+        </p:nvSpPr>
+        <p:spPr/>
+        <p:txBody>
+          <a:bodyPr/>
+          <a:lstStyle/>
+          <a:p>
+            <a:fld id="{6B053770-FD16-42CB-98BB-967786CBD56A}" type="slidenum">
+              <a:rPr lang="en-US" smtClean="0"/>
+              <a:t>11</a:t>
+            </a:fld>
+            <a:endParaRPr lang="en-US"/>
+          </a:p>
+        </p:txBody>
+      </p:sp>
+    </p:spTree>
+    <p:extLst>
+      <p:ext uri="{BB962C8B-B14F-4D97-AF65-F5344CB8AC3E}">
+        <p14:creationId xmlns:p14="http://schemas.microsoft.com/office/powerpoint/2010/main" val="3612862909"/>
+      </p:ext>
+    </p:extLst>
+  </p:cSld>
+  <p:clrMapOvr>
+    <a:masterClrMapping/>
+  </p:clrMapOvr>
+</p:notes>
+</file>
+
+<file path=ppt/notesSlides/notesSlide11.xml><?xml version="1.0" encoding="utf-8"?>
+<p:notes xmlns:a="http://schemas.openxmlformats.org/drawingml/2006/main" xmlns:r="http://schemas.openxmlformats.org/officeDocument/2006/relationships" xmlns:p="http://schemas.openxmlformats.org/presentationml/2006/main">
+  <p:cSld>
+    <p:spTree>
+      <p:nvGrpSpPr>
+        <p:cNvPr id="1" name=""/>
+        <p:cNvGrpSpPr/>
+        <p:nvPr/>
+      </p:nvGrpSpPr>
+      <p:grpSpPr>
+        <a:xfrm>
+          <a:off x="0" y="0"/>
+          <a:ext cx="0" cy="0"/>
+          <a:chOff x="0" y="0"/>
+          <a:chExt cx="0" cy="0"/>
+        </a:xfrm>
+      </p:grpSpPr>
+      <p:sp>
+        <p:nvSpPr>
+          <p:cNvPr id="2" name="Slide Image Placeholder 1"/>
+          <p:cNvSpPr>
+            <a:spLocks noGrp="1" noRot="1" noChangeAspect="1"/>
+          </p:cNvSpPr>
+          <p:nvPr>
+            <p:ph type="sldImg"/>
+          </p:nvPr>
+        </p:nvSpPr>
+        <p:spPr/>
+      </p:sp>
+      <p:sp>
+        <p:nvSpPr>
+          <p:cNvPr id="3" name="Notes Placeholder 2"/>
+          <p:cNvSpPr>
+            <a:spLocks noGrp="1"/>
+          </p:cNvSpPr>
+          <p:nvPr>
+            <p:ph type="body" idx="1"/>
+          </p:nvPr>
+        </p:nvSpPr>
+        <p:spPr/>
+        <p:txBody>
+          <a:bodyPr/>
+          <a:lstStyle/>
+          <a:p>
+            <a:r>
+              <a:rPr lang="en-US" dirty="0"/>
+              <a:t>Let’s also convert some of the variables to a more appropriate type. the </a:t>
+            </a:r>
+            <a:r>
+              <a:rPr lang="en-US" dirty="0" err="1"/>
+              <a:t>credit.policy</a:t>
+            </a:r>
+            <a:r>
+              <a:rPr lang="en-US" dirty="0"/>
+              <a:t> and </a:t>
+            </a:r>
+            <a:r>
+              <a:rPr lang="en-US" dirty="0" err="1"/>
+              <a:t>not.fully.paid</a:t>
+            </a:r>
+            <a:r>
+              <a:rPr lang="en-US" dirty="0"/>
+              <a:t> variables are </a:t>
+            </a:r>
+            <a:r>
+              <a:rPr lang="en-US" dirty="0" err="1"/>
+              <a:t>logicals</a:t>
+            </a:r>
+            <a:r>
+              <a:rPr lang="en-US" dirty="0"/>
+              <a:t>, and the purpose variable we will use as a factor.</a:t>
+            </a:r>
+          </a:p>
+          <a:p>
+            <a:endParaRPr lang="en-US" dirty="0"/>
+          </a:p>
+          <a:p>
+            <a:r>
+              <a:rPr lang="en-US" dirty="0"/>
+              <a:t>Now we can further explore the data to see how the numeric variables differ based on the on the </a:t>
+            </a:r>
+            <a:r>
+              <a:rPr lang="en-US" dirty="0" err="1"/>
+              <a:t>credit.policy</a:t>
+            </a:r>
+            <a:r>
+              <a:rPr lang="en-US" dirty="0"/>
+              <a:t>, </a:t>
+            </a:r>
+            <a:r>
+              <a:rPr lang="en-US" dirty="0" err="1"/>
+              <a:t>not.fully.paid</a:t>
+            </a:r>
+            <a:r>
+              <a:rPr lang="en-US" dirty="0"/>
+              <a:t>, and purpose variables. Let’s make some boxplots to visualize this.</a:t>
+            </a:r>
+          </a:p>
+        </p:txBody>
+      </p:sp>
+      <p:sp>
+        <p:nvSpPr>
+          <p:cNvPr id="4" name="Slide Number Placeholder 3"/>
+          <p:cNvSpPr>
+            <a:spLocks noGrp="1"/>
+          </p:cNvSpPr>
+          <p:nvPr>
+            <p:ph type="sldNum" sz="quarter" idx="5"/>
+          </p:nvPr>
+        </p:nvSpPr>
+        <p:spPr/>
+        <p:txBody>
+          <a:bodyPr/>
+          <a:lstStyle/>
+          <a:p>
+            <a:fld id="{6B053770-FD16-42CB-98BB-967786CBD56A}" type="slidenum">
+              <a:rPr lang="en-US" smtClean="0"/>
+              <a:t>12</a:t>
+            </a:fld>
+            <a:endParaRPr lang="en-US"/>
+          </a:p>
+        </p:txBody>
+      </p:sp>
+    </p:spTree>
+    <p:extLst>
+      <p:ext uri="{BB962C8B-B14F-4D97-AF65-F5344CB8AC3E}">
+        <p14:creationId xmlns:p14="http://schemas.microsoft.com/office/powerpoint/2010/main" val="2269307674"/>
+      </p:ext>
+    </p:extLst>
+  </p:cSld>
+  <p:clrMapOvr>
+    <a:masterClrMapping/>
+  </p:clrMapOvr>
+</p:notes>
+</file>
+
 <file path=ppt/notesSlides/notesSlide2.xml><?xml version="1.0" encoding="utf-8"?>
 <p:notes xmlns:a="http://schemas.openxmlformats.org/drawingml/2006/main" xmlns:r="http://schemas.openxmlformats.org/officeDocument/2006/relationships" xmlns:p="http://schemas.openxmlformats.org/presentationml/2006/main">
   <p:cSld>
@@ -1450,6 +1682,267 @@
     <p:extLst>
       <p:ext uri="{BB962C8B-B14F-4D97-AF65-F5344CB8AC3E}">
         <p14:creationId xmlns:p14="http://schemas.microsoft.com/office/powerpoint/2010/main" val="4282786217"/>
+      </p:ext>
+    </p:extLst>
+  </p:cSld>
+  <p:clrMapOvr>
+    <a:masterClrMapping/>
+  </p:clrMapOvr>
+</p:notes>
+</file>
+
+<file path=ppt/notesSlides/notesSlide7.xml><?xml version="1.0" encoding="utf-8"?>
+<p:notes xmlns:a="http://schemas.openxmlformats.org/drawingml/2006/main" xmlns:r="http://schemas.openxmlformats.org/officeDocument/2006/relationships" xmlns:p="http://schemas.openxmlformats.org/presentationml/2006/main">
+  <p:cSld>
+    <p:spTree>
+      <p:nvGrpSpPr>
+        <p:cNvPr id="1" name=""/>
+        <p:cNvGrpSpPr/>
+        <p:nvPr/>
+      </p:nvGrpSpPr>
+      <p:grpSpPr>
+        <a:xfrm>
+          <a:off x="0" y="0"/>
+          <a:ext cx="0" cy="0"/>
+          <a:chOff x="0" y="0"/>
+          <a:chExt cx="0" cy="0"/>
+        </a:xfrm>
+      </p:grpSpPr>
+      <p:sp>
+        <p:nvSpPr>
+          <p:cNvPr id="2" name="Slide Image Placeholder 1"/>
+          <p:cNvSpPr>
+            <a:spLocks noGrp="1" noRot="1" noChangeAspect="1"/>
+          </p:cNvSpPr>
+          <p:nvPr>
+            <p:ph type="sldImg"/>
+          </p:nvPr>
+        </p:nvSpPr>
+        <p:spPr/>
+      </p:sp>
+      <p:sp>
+        <p:nvSpPr>
+          <p:cNvPr id="3" name="Notes Placeholder 2"/>
+          <p:cNvSpPr>
+            <a:spLocks noGrp="1"/>
+          </p:cNvSpPr>
+          <p:nvPr>
+            <p:ph type="body" idx="1"/>
+          </p:nvPr>
+        </p:nvSpPr>
+        <p:spPr/>
+        <p:txBody>
+          <a:bodyPr/>
+          <a:lstStyle/>
+          <a:p>
+            <a:r>
+              <a:rPr lang="en-US" dirty="0"/>
+              <a:t>Some of these variables look somewhat normal, and it would make sense to create a QQ-Plot for them later.</a:t>
+            </a:r>
+          </a:p>
+        </p:txBody>
+      </p:sp>
+      <p:sp>
+        <p:nvSpPr>
+          <p:cNvPr id="4" name="Slide Number Placeholder 3"/>
+          <p:cNvSpPr>
+            <a:spLocks noGrp="1"/>
+          </p:cNvSpPr>
+          <p:nvPr>
+            <p:ph type="sldNum" sz="quarter" idx="5"/>
+          </p:nvPr>
+        </p:nvSpPr>
+        <p:spPr/>
+        <p:txBody>
+          <a:bodyPr/>
+          <a:lstStyle/>
+          <a:p>
+            <a:fld id="{6B053770-FD16-42CB-98BB-967786CBD56A}" type="slidenum">
+              <a:rPr lang="en-US" smtClean="0"/>
+              <a:t>8</a:t>
+            </a:fld>
+            <a:endParaRPr lang="en-US"/>
+          </a:p>
+        </p:txBody>
+      </p:sp>
+    </p:spTree>
+    <p:extLst>
+      <p:ext uri="{BB962C8B-B14F-4D97-AF65-F5344CB8AC3E}">
+        <p14:creationId xmlns:p14="http://schemas.microsoft.com/office/powerpoint/2010/main" val="894586321"/>
+      </p:ext>
+    </p:extLst>
+  </p:cSld>
+  <p:clrMapOvr>
+    <a:masterClrMapping/>
+  </p:clrMapOvr>
+</p:notes>
+</file>
+
+<file path=ppt/notesSlides/notesSlide8.xml><?xml version="1.0" encoding="utf-8"?>
+<p:notes xmlns:a="http://schemas.openxmlformats.org/drawingml/2006/main" xmlns:r="http://schemas.openxmlformats.org/officeDocument/2006/relationships" xmlns:p="http://schemas.openxmlformats.org/presentationml/2006/main">
+  <p:cSld>
+    <p:spTree>
+      <p:nvGrpSpPr>
+        <p:cNvPr id="1" name=""/>
+        <p:cNvGrpSpPr/>
+        <p:nvPr/>
+      </p:nvGrpSpPr>
+      <p:grpSpPr>
+        <a:xfrm>
+          <a:off x="0" y="0"/>
+          <a:ext cx="0" cy="0"/>
+          <a:chOff x="0" y="0"/>
+          <a:chExt cx="0" cy="0"/>
+        </a:xfrm>
+      </p:grpSpPr>
+      <p:sp>
+        <p:nvSpPr>
+          <p:cNvPr id="2" name="Slide Image Placeholder 1"/>
+          <p:cNvSpPr>
+            <a:spLocks noGrp="1" noRot="1" noChangeAspect="1"/>
+          </p:cNvSpPr>
+          <p:nvPr>
+            <p:ph type="sldImg"/>
+          </p:nvPr>
+        </p:nvSpPr>
+        <p:spPr/>
+      </p:sp>
+      <p:sp>
+        <p:nvSpPr>
+          <p:cNvPr id="3" name="Notes Placeholder 2"/>
+          <p:cNvSpPr>
+            <a:spLocks noGrp="1"/>
+          </p:cNvSpPr>
+          <p:nvPr>
+            <p:ph type="body" idx="1"/>
+          </p:nvPr>
+        </p:nvSpPr>
+        <p:spPr/>
+        <p:txBody>
+          <a:bodyPr/>
+          <a:lstStyle/>
+          <a:p>
+            <a:r>
+              <a:rPr lang="en-US" dirty="0"/>
+              <a:t>We can see that some of these variables have issues with outliers.</a:t>
+            </a:r>
+          </a:p>
+        </p:txBody>
+      </p:sp>
+      <p:sp>
+        <p:nvSpPr>
+          <p:cNvPr id="4" name="Slide Number Placeholder 3"/>
+          <p:cNvSpPr>
+            <a:spLocks noGrp="1"/>
+          </p:cNvSpPr>
+          <p:nvPr>
+            <p:ph type="sldNum" sz="quarter" idx="5"/>
+          </p:nvPr>
+        </p:nvSpPr>
+        <p:spPr/>
+        <p:txBody>
+          <a:bodyPr/>
+          <a:lstStyle/>
+          <a:p>
+            <a:fld id="{6B053770-FD16-42CB-98BB-967786CBD56A}" type="slidenum">
+              <a:rPr lang="en-US" smtClean="0"/>
+              <a:t>9</a:t>
+            </a:fld>
+            <a:endParaRPr lang="en-US"/>
+          </a:p>
+        </p:txBody>
+      </p:sp>
+    </p:spTree>
+    <p:extLst>
+      <p:ext uri="{BB962C8B-B14F-4D97-AF65-F5344CB8AC3E}">
+        <p14:creationId xmlns:p14="http://schemas.microsoft.com/office/powerpoint/2010/main" val="1577256021"/>
+      </p:ext>
+    </p:extLst>
+  </p:cSld>
+  <p:clrMapOvr>
+    <a:masterClrMapping/>
+  </p:clrMapOvr>
+</p:notes>
+</file>
+
+<file path=ppt/notesSlides/notesSlide9.xml><?xml version="1.0" encoding="utf-8"?>
+<p:notes xmlns:a="http://schemas.openxmlformats.org/drawingml/2006/main" xmlns:r="http://schemas.openxmlformats.org/officeDocument/2006/relationships" xmlns:p="http://schemas.openxmlformats.org/presentationml/2006/main">
+  <p:cSld>
+    <p:spTree>
+      <p:nvGrpSpPr>
+        <p:cNvPr id="1" name=""/>
+        <p:cNvGrpSpPr/>
+        <p:nvPr/>
+      </p:nvGrpSpPr>
+      <p:grpSpPr>
+        <a:xfrm>
+          <a:off x="0" y="0"/>
+          <a:ext cx="0" cy="0"/>
+          <a:chOff x="0" y="0"/>
+          <a:chExt cx="0" cy="0"/>
+        </a:xfrm>
+      </p:grpSpPr>
+      <p:sp>
+        <p:nvSpPr>
+          <p:cNvPr id="2" name="Slide Image Placeholder 1"/>
+          <p:cNvSpPr>
+            <a:spLocks noGrp="1" noRot="1" noChangeAspect="1"/>
+          </p:cNvSpPr>
+          <p:nvPr>
+            <p:ph type="sldImg"/>
+          </p:nvPr>
+        </p:nvSpPr>
+        <p:spPr/>
+      </p:sp>
+      <p:sp>
+        <p:nvSpPr>
+          <p:cNvPr id="3" name="Notes Placeholder 2"/>
+          <p:cNvSpPr>
+            <a:spLocks noGrp="1"/>
+          </p:cNvSpPr>
+          <p:nvPr>
+            <p:ph type="body" idx="1"/>
+          </p:nvPr>
+        </p:nvSpPr>
+        <p:spPr/>
+        <p:txBody>
+          <a:bodyPr/>
+          <a:lstStyle/>
+          <a:p>
+            <a:r>
+              <a:rPr lang="en-US" dirty="0"/>
+              <a:t>From this we can see that the purpose variable would be a good candidate to perform ANOVA tests on.</a:t>
+            </a:r>
+          </a:p>
+        </p:txBody>
+      </p:sp>
+      <p:sp>
+        <p:nvSpPr>
+          <p:cNvPr id="4" name="Slide Number Placeholder 3"/>
+          <p:cNvSpPr>
+            <a:spLocks noGrp="1"/>
+          </p:cNvSpPr>
+          <p:nvPr>
+            <p:ph type="sldNum" sz="quarter" idx="5"/>
+          </p:nvPr>
+        </p:nvSpPr>
+        <p:spPr/>
+        <p:txBody>
+          <a:bodyPr/>
+          <a:lstStyle/>
+          <a:p>
+            <a:fld id="{6B053770-FD16-42CB-98BB-967786CBD56A}" type="slidenum">
+              <a:rPr lang="en-US" smtClean="0"/>
+              <a:t>10</a:t>
+            </a:fld>
+            <a:endParaRPr lang="en-US"/>
+          </a:p>
+        </p:txBody>
+      </p:sp>
+    </p:spTree>
+    <p:extLst>
+      <p:ext uri="{BB962C8B-B14F-4D97-AF65-F5344CB8AC3E}">
+        <p14:creationId xmlns:p14="http://schemas.microsoft.com/office/powerpoint/2010/main" val="850764692"/>
       </p:ext>
     </p:extLst>
   </p:cSld>
@@ -5944,7 +6437,7 @@
           <p:nvPr/>
         </p:nvPicPr>
         <p:blipFill rotWithShape="1">
-          <a:blip r:embed="rId2"/>
+          <a:blip r:embed="rId3"/>
           <a:srcRect t="10770" r="84371" b="20000"/>
           <a:stretch/>
         </p:blipFill>
@@ -5973,7 +6466,7 @@
           <p:nvPr/>
         </p:nvPicPr>
         <p:blipFill rotWithShape="1">
-          <a:blip r:embed="rId2"/>
+          <a:blip r:embed="rId3"/>
           <a:srcRect l="15172"/>
           <a:stretch/>
         </p:blipFill>
@@ -6085,7 +6578,7 @@
           <p:nvPr/>
         </p:nvPicPr>
         <p:blipFill>
-          <a:blip r:embed="rId3">
+          <a:blip r:embed="rId4">
             <a:extLst>
               <a:ext uri="{28A0092B-C50C-407E-A947-70E740481C1C}">
                 <a14:useLocalDpi xmlns:a14="http://schemas.microsoft.com/office/drawing/2010/main" val="0"/>
@@ -6151,7 +6644,7 @@
           <p:nvPr/>
         </p:nvPicPr>
         <p:blipFill rotWithShape="1">
-          <a:blip r:embed="rId2"/>
+          <a:blip r:embed="rId3"/>
           <a:srcRect t="10770" r="84371" b="20000"/>
           <a:stretch/>
         </p:blipFill>
@@ -6180,7 +6673,7 @@
           <p:nvPr/>
         </p:nvPicPr>
         <p:blipFill rotWithShape="1">
-          <a:blip r:embed="rId2"/>
+          <a:blip r:embed="rId3"/>
           <a:srcRect l="15172"/>
           <a:stretch/>
         </p:blipFill>
@@ -6477,7 +6970,7 @@
           <p:nvPr/>
         </p:nvPicPr>
         <p:blipFill rotWithShape="1">
-          <a:blip r:embed="rId2"/>
+          <a:blip r:embed="rId3"/>
           <a:srcRect t="10770" r="84371" b="20000"/>
           <a:stretch/>
         </p:blipFill>
@@ -6506,7 +6999,7 @@
           <p:nvPr/>
         </p:nvPicPr>
         <p:blipFill rotWithShape="1">
-          <a:blip r:embed="rId2"/>
+          <a:blip r:embed="rId3"/>
           <a:srcRect l="15172"/>
           <a:stretch/>
         </p:blipFill>
@@ -6618,7 +7111,7 @@
           <p:nvPr/>
         </p:nvPicPr>
         <p:blipFill>
-          <a:blip r:embed="rId3">
+          <a:blip r:embed="rId4">
             <a:extLst>
               <a:ext uri="{28A0092B-C50C-407E-A947-70E740481C1C}">
                 <a14:useLocalDpi xmlns:a14="http://schemas.microsoft.com/office/drawing/2010/main" val="0"/>
@@ -11504,7 +11997,7 @@
           <p:nvPr/>
         </p:nvPicPr>
         <p:blipFill rotWithShape="1">
-          <a:blip r:embed="rId2"/>
+          <a:blip r:embed="rId3"/>
           <a:srcRect t="10770" r="84371" b="20000"/>
           <a:stretch/>
         </p:blipFill>
@@ -11533,7 +12026,7 @@
           <p:nvPr/>
         </p:nvPicPr>
         <p:blipFill rotWithShape="1">
-          <a:blip r:embed="rId2"/>
+          <a:blip r:embed="rId3"/>
           <a:srcRect l="15172"/>
           <a:stretch/>
         </p:blipFill>
@@ -11645,7 +12138,7 @@
           <p:nvPr/>
         </p:nvPicPr>
         <p:blipFill>
-          <a:blip r:embed="rId3">
+          <a:blip r:embed="rId4">
             <a:extLst>
               <a:ext uri="{28A0092B-C50C-407E-A947-70E740481C1C}">
                 <a14:useLocalDpi xmlns:a14="http://schemas.microsoft.com/office/drawing/2010/main" val="0"/>
@@ -11711,7 +12204,7 @@
           <p:nvPr/>
         </p:nvPicPr>
         <p:blipFill rotWithShape="1">
-          <a:blip r:embed="rId2"/>
+          <a:blip r:embed="rId3"/>
           <a:srcRect t="10770" r="84371" b="20000"/>
           <a:stretch/>
         </p:blipFill>
@@ -11740,7 +12233,7 @@
           <p:nvPr/>
         </p:nvPicPr>
         <p:blipFill rotWithShape="1">
-          <a:blip r:embed="rId2"/>
+          <a:blip r:embed="rId3"/>
           <a:srcRect l="15172"/>
           <a:stretch/>
         </p:blipFill>
@@ -11852,7 +12345,7 @@
           <p:nvPr/>
         </p:nvPicPr>
         <p:blipFill>
-          <a:blip r:embed="rId3">
+          <a:blip r:embed="rId4">
             <a:extLst>
               <a:ext uri="{28A0092B-C50C-407E-A947-70E740481C1C}">
                 <a14:useLocalDpi xmlns:a14="http://schemas.microsoft.com/office/drawing/2010/main" val="0"/>

</xml_diff>